<commit_message>
new diagram, new pp
</commit_message>
<xml_diff>
--- a/Gamerev.pptx
+++ b/Gamerev.pptx
@@ -11,8 +11,10 @@
     <p:sldId id="259" r:id="rId5"/>
     <p:sldId id="264" r:id="rId6"/>
     <p:sldId id="261" r:id="rId7"/>
-    <p:sldId id="262" r:id="rId8"/>
-    <p:sldId id="263" r:id="rId9"/>
+    <p:sldId id="266" r:id="rId8"/>
+    <p:sldId id="262" r:id="rId9"/>
+    <p:sldId id="265" r:id="rId10"/>
+    <p:sldId id="263" r:id="rId11"/>
   </p:sldIdLst>
   <p:sldSz cx="12192000" cy="6858000"/>
   <p:notesSz cx="6858000" cy="9144000"/>
@@ -111,6 +113,11 @@
       </a:defRPr>
     </a:lvl9pPr>
   </p:defaultTextStyle>
+  <p:extLst>
+    <p:ext uri="{EFAFB233-063F-42B5-8137-9DF3F51BA10A}">
+      <p15:sldGuideLst xmlns:p15="http://schemas.microsoft.com/office/powerpoint/2012/main"/>
+    </p:ext>
+  </p:extLst>
 </p:presentation>
 </file>
 
@@ -5791,6 +5798,161 @@
 </p:sld>
 </file>
 
+<file path=ppt/slides/slide10.xml><?xml version="1.0" encoding="utf-8"?>
+<p:sld xmlns:a="http://schemas.openxmlformats.org/drawingml/2006/main" xmlns:r="http://schemas.openxmlformats.org/officeDocument/2006/relationships" xmlns:p="http://schemas.openxmlformats.org/presentationml/2006/main">
+  <p:cSld>
+    <p:spTree>
+      <p:nvGrpSpPr>
+        <p:cNvPr id="1" name=""/>
+        <p:cNvGrpSpPr/>
+        <p:nvPr/>
+      </p:nvGrpSpPr>
+      <p:grpSpPr>
+        <a:xfrm>
+          <a:off x="0" y="0"/>
+          <a:ext cx="0" cy="0"/>
+          <a:chOff x="0" y="0"/>
+          <a:chExt cx="0" cy="0"/>
+        </a:xfrm>
+      </p:grpSpPr>
+      <p:sp>
+        <p:nvSpPr>
+          <p:cNvPr id="2" name="Titel 1">
+            <a:extLst>
+              <a:ext uri="{FF2B5EF4-FFF2-40B4-BE49-F238E27FC236}">
+                <a16:creationId xmlns:a16="http://schemas.microsoft.com/office/drawing/2014/main" id="{A24D21CF-6803-48D5-85E7-10B922D346E9}"/>
+              </a:ext>
+            </a:extLst>
+          </p:cNvPr>
+          <p:cNvSpPr>
+            <a:spLocks noGrp="1"/>
+          </p:cNvSpPr>
+          <p:nvPr>
+            <p:ph type="title"/>
+          </p:nvPr>
+        </p:nvSpPr>
+        <p:spPr>
+          <a:xfrm>
+            <a:off x="1790700" y="782128"/>
+            <a:ext cx="8610600" cy="1293028"/>
+          </a:xfrm>
+        </p:spPr>
+        <p:txBody>
+          <a:bodyPr/>
+          <a:lstStyle/>
+          <a:p>
+            <a:pPr algn="ctr"/>
+            <a:r>
+              <a:rPr lang="da-DK" dirty="0" err="1"/>
+              <a:t>microservices</a:t>
+            </a:r>
+            <a:endParaRPr lang="da-DK" dirty="0"/>
+          </a:p>
+        </p:txBody>
+      </p:sp>
+      <p:pic>
+        <p:nvPicPr>
+          <p:cNvPr id="5" name="Billede 4">
+            <a:extLst>
+              <a:ext uri="{FF2B5EF4-FFF2-40B4-BE49-F238E27FC236}">
+                <a16:creationId xmlns:a16="http://schemas.microsoft.com/office/drawing/2014/main" id="{F2D09126-AB7C-436C-A75F-021F66FC4F7C}"/>
+              </a:ext>
+            </a:extLst>
+          </p:cNvPr>
+          <p:cNvPicPr>
+            <a:picLocks noChangeAspect="1"/>
+          </p:cNvPicPr>
+          <p:nvPr/>
+        </p:nvPicPr>
+        <p:blipFill>
+          <a:blip r:embed="rId2"/>
+          <a:stretch>
+            <a:fillRect/>
+          </a:stretch>
+        </p:blipFill>
+        <p:spPr>
+          <a:xfrm>
+            <a:off x="897528" y="2201663"/>
+            <a:ext cx="10396943" cy="3590852"/>
+          </a:xfrm>
+          <a:prstGeom prst="rect">
+            <a:avLst/>
+          </a:prstGeom>
+        </p:spPr>
+      </p:pic>
+      <p:pic>
+        <p:nvPicPr>
+          <p:cNvPr id="7" name="Billede 6">
+            <a:extLst>
+              <a:ext uri="{FF2B5EF4-FFF2-40B4-BE49-F238E27FC236}">
+                <a16:creationId xmlns:a16="http://schemas.microsoft.com/office/drawing/2014/main" id="{594C0448-D999-449E-967E-A6386B054630}"/>
+              </a:ext>
+            </a:extLst>
+          </p:cNvPr>
+          <p:cNvPicPr>
+            <a:picLocks noChangeAspect="1"/>
+          </p:cNvPicPr>
+          <p:nvPr/>
+        </p:nvPicPr>
+        <p:blipFill>
+          <a:blip r:embed="rId3"/>
+          <a:stretch>
+            <a:fillRect/>
+          </a:stretch>
+        </p:blipFill>
+        <p:spPr>
+          <a:xfrm>
+            <a:off x="3152713" y="5451221"/>
+            <a:ext cx="5476382" cy="935601"/>
+          </a:xfrm>
+          <a:prstGeom prst="rect">
+            <a:avLst/>
+          </a:prstGeom>
+        </p:spPr>
+      </p:pic>
+      <p:pic>
+        <p:nvPicPr>
+          <p:cNvPr id="9" name="Billede 8">
+            <a:extLst>
+              <a:ext uri="{FF2B5EF4-FFF2-40B4-BE49-F238E27FC236}">
+                <a16:creationId xmlns:a16="http://schemas.microsoft.com/office/drawing/2014/main" id="{397C345C-B5A8-4195-B22F-AA7E94D00E68}"/>
+              </a:ext>
+            </a:extLst>
+          </p:cNvPr>
+          <p:cNvPicPr>
+            <a:picLocks noChangeAspect="1"/>
+          </p:cNvPicPr>
+          <p:nvPr/>
+        </p:nvPicPr>
+        <p:blipFill>
+          <a:blip r:embed="rId3"/>
+          <a:stretch>
+            <a:fillRect/>
+          </a:stretch>
+        </p:blipFill>
+        <p:spPr>
+          <a:xfrm>
+            <a:off x="7360729" y="3941430"/>
+            <a:ext cx="4182059" cy="1851085"/>
+          </a:xfrm>
+          <a:prstGeom prst="rect">
+            <a:avLst/>
+          </a:prstGeom>
+        </p:spPr>
+      </p:pic>
+    </p:spTree>
+    <p:extLst>
+      <p:ext uri="{BB962C8B-B14F-4D97-AF65-F5344CB8AC3E}">
+        <p14:creationId xmlns:p14="http://schemas.microsoft.com/office/powerpoint/2010/main" val="2229089420"/>
+      </p:ext>
+    </p:extLst>
+  </p:cSld>
+  <p:clrMapOvr>
+    <a:masterClrMapping/>
+  </p:clrMapOvr>
+</p:sld>
+</file>
+
 <file path=ppt/slides/slide2.xml><?xml version="1.0" encoding="utf-8"?>
 <p:sld xmlns:a="http://schemas.openxmlformats.org/drawingml/2006/main" xmlns:r="http://schemas.openxmlformats.org/officeDocument/2006/relationships" xmlns:p="http://schemas.openxmlformats.org/presentationml/2006/main">
   <p:cSld>
@@ -6037,12 +6199,8 @@
           <a:lstStyle/>
           <a:p>
             <a:r>
-              <a:rPr lang="da-DK" dirty="0" err="1"/>
-              <a:t>What</a:t>
-            </a:r>
-            <a:r>
               <a:rPr lang="da-DK" dirty="0"/>
-              <a:t> is </a:t>
+              <a:t>Hvad er </a:t>
             </a:r>
             <a:r>
               <a:rPr lang="da-DK" dirty="0" err="1"/>
@@ -6085,12 +6243,174 @@
           <a:chExt cx="0" cy="0"/>
         </a:xfrm>
       </p:grpSpPr>
+      <p:sp>
+        <p:nvSpPr>
+          <p:cNvPr id="12" name="Tekstfelt 11">
+            <a:extLst>
+              <a:ext uri="{FF2B5EF4-FFF2-40B4-BE49-F238E27FC236}">
+                <a16:creationId xmlns:a16="http://schemas.microsoft.com/office/drawing/2014/main" id="{88A6A9CB-75BA-4ED7-B1C6-AB33F3AAAC38}"/>
+              </a:ext>
+            </a:extLst>
+          </p:cNvPr>
+          <p:cNvSpPr txBox="1"/>
+          <p:nvPr/>
+        </p:nvSpPr>
+        <p:spPr>
+          <a:xfrm>
+            <a:off x="399495" y="1819922"/>
+            <a:ext cx="2237173" cy="4247317"/>
+          </a:xfrm>
+          <a:prstGeom prst="rect">
+            <a:avLst/>
+          </a:prstGeom>
+          <a:noFill/>
+        </p:spPr>
+        <p:txBody>
+          <a:bodyPr wrap="square" rtlCol="0">
+            <a:spAutoFit/>
+          </a:bodyPr>
+          <a:lstStyle/>
+          <a:p>
+            <a:pPr marL="285750" indent="-285750">
+              <a:buFont typeface="Arial" panose="020B0604020202020204" pitchFamily="34" charset="0"/>
+              <a:buChar char="•"/>
+            </a:pPr>
+            <a:r>
+              <a:rPr lang="da-DK" dirty="0"/>
+              <a:t>Docker</a:t>
+            </a:r>
+          </a:p>
+          <a:p>
+            <a:endParaRPr lang="da-DK" dirty="0"/>
+          </a:p>
+          <a:p>
+            <a:r>
+              <a:rPr lang="da-DK" dirty="0"/>
+              <a:t>Sprog:</a:t>
+            </a:r>
+          </a:p>
+          <a:p>
+            <a:pPr marL="285750" indent="-285750">
+              <a:buFont typeface="Arial" panose="020B0604020202020204" pitchFamily="34" charset="0"/>
+              <a:buChar char="•"/>
+            </a:pPr>
+            <a:r>
+              <a:rPr lang="da-DK" dirty="0"/>
+              <a:t>Java</a:t>
+            </a:r>
+          </a:p>
+          <a:p>
+            <a:pPr marL="285750" indent="-285750">
+              <a:buFont typeface="Arial" panose="020B0604020202020204" pitchFamily="34" charset="0"/>
+              <a:buChar char="•"/>
+            </a:pPr>
+            <a:r>
+              <a:rPr lang="da-DK" dirty="0"/>
+              <a:t>Python</a:t>
+            </a:r>
+          </a:p>
+          <a:p>
+            <a:pPr marL="285750" indent="-285750">
+              <a:buFont typeface="Arial" panose="020B0604020202020204" pitchFamily="34" charset="0"/>
+              <a:buChar char="•"/>
+            </a:pPr>
+            <a:r>
+              <a:rPr lang="da-DK" dirty="0"/>
+              <a:t>JavaScript</a:t>
+            </a:r>
+          </a:p>
+          <a:p>
+            <a:pPr marL="285750" indent="-285750">
+              <a:buFont typeface="Arial" panose="020B0604020202020204" pitchFamily="34" charset="0"/>
+              <a:buChar char="•"/>
+            </a:pPr>
+            <a:r>
+              <a:rPr lang="da-DK" dirty="0" err="1"/>
+              <a:t>TypeScript</a:t>
+            </a:r>
+            <a:endParaRPr lang="da-DK" dirty="0"/>
+          </a:p>
+          <a:p>
+            <a:pPr marL="285750" indent="-285750">
+              <a:buFont typeface="Arial" panose="020B0604020202020204" pitchFamily="34" charset="0"/>
+              <a:buChar char="•"/>
+            </a:pPr>
+            <a:endParaRPr lang="da-DK" dirty="0"/>
+          </a:p>
+          <a:p>
+            <a:r>
+              <a:rPr lang="da-DK" dirty="0"/>
+              <a:t>Frameworks:</a:t>
+            </a:r>
+          </a:p>
+          <a:p>
+            <a:pPr marL="285750" indent="-285750">
+              <a:buFont typeface="Arial" panose="020B0604020202020204" pitchFamily="34" charset="0"/>
+              <a:buChar char="•"/>
+            </a:pPr>
+            <a:r>
+              <a:rPr lang="da-DK" dirty="0"/>
+              <a:t>Vue.js</a:t>
+            </a:r>
+          </a:p>
+          <a:p>
+            <a:pPr marL="285750" indent="-285750">
+              <a:buFont typeface="Arial" panose="020B0604020202020204" pitchFamily="34" charset="0"/>
+              <a:buChar char="•"/>
+            </a:pPr>
+            <a:r>
+              <a:rPr lang="da-DK" dirty="0" err="1"/>
+              <a:t>NuxtJS</a:t>
+            </a:r>
+            <a:endParaRPr lang="da-DK" dirty="0"/>
+          </a:p>
+          <a:p>
+            <a:pPr marL="285750" indent="-285750">
+              <a:buFont typeface="Arial" panose="020B0604020202020204" pitchFamily="34" charset="0"/>
+              <a:buChar char="•"/>
+            </a:pPr>
+            <a:r>
+              <a:rPr lang="da-DK" dirty="0"/>
+              <a:t>Spring Boot</a:t>
+            </a:r>
+          </a:p>
+          <a:p>
+            <a:pPr marL="285750" indent="-285750">
+              <a:buFont typeface="Arial" panose="020B0604020202020204" pitchFamily="34" charset="0"/>
+              <a:buChar char="•"/>
+            </a:pPr>
+            <a:r>
+              <a:rPr lang="da-DK" dirty="0" err="1"/>
+              <a:t>NodeJS</a:t>
+            </a:r>
+            <a:endParaRPr lang="da-DK" dirty="0"/>
+          </a:p>
+          <a:p>
+            <a:pPr marL="285750" indent="-285750">
+              <a:buFont typeface="Arial" panose="020B0604020202020204" pitchFamily="34" charset="0"/>
+              <a:buChar char="•"/>
+            </a:pPr>
+            <a:r>
+              <a:rPr lang="da-DK" dirty="0" err="1"/>
+              <a:t>ExpressJS</a:t>
+            </a:r>
+            <a:endParaRPr lang="da-DK" dirty="0"/>
+          </a:p>
+          <a:p>
+            <a:pPr marL="285750" indent="-285750">
+              <a:buFont typeface="Arial" panose="020B0604020202020204" pitchFamily="34" charset="0"/>
+              <a:buChar char="•"/>
+            </a:pPr>
+            <a:endParaRPr lang="da-DK" dirty="0"/>
+          </a:p>
+        </p:txBody>
+      </p:sp>
       <p:pic>
         <p:nvPicPr>
-          <p:cNvPr id="9" name="Billede 8">
+          <p:cNvPr id="3" name="Billede 2">
             <a:extLst>
               <a:ext uri="{FF2B5EF4-FFF2-40B4-BE49-F238E27FC236}">
-                <a16:creationId xmlns:a16="http://schemas.microsoft.com/office/drawing/2014/main" id="{7D2A1E71-213C-49AC-93FD-A3772D0589D2}"/>
+                <a16:creationId xmlns:a16="http://schemas.microsoft.com/office/drawing/2014/main" id="{595264DC-4910-4137-9B6E-40E7046716B9}"/>
               </a:ext>
             </a:extLst>
           </p:cNvPr>
@@ -6107,176 +6427,14 @@
         </p:blipFill>
         <p:spPr>
           <a:xfrm>
-            <a:off x="2535558" y="1065320"/>
-            <a:ext cx="7120883" cy="5792680"/>
+            <a:off x="2810667" y="1322773"/>
+            <a:ext cx="8981838" cy="5046307"/>
           </a:xfrm>
           <a:prstGeom prst="rect">
             <a:avLst/>
           </a:prstGeom>
         </p:spPr>
       </p:pic>
-      <p:sp>
-        <p:nvSpPr>
-          <p:cNvPr id="12" name="Tekstfelt 11">
-            <a:extLst>
-              <a:ext uri="{FF2B5EF4-FFF2-40B4-BE49-F238E27FC236}">
-                <a16:creationId xmlns:a16="http://schemas.microsoft.com/office/drawing/2014/main" id="{88A6A9CB-75BA-4ED7-B1C6-AB33F3AAAC38}"/>
-              </a:ext>
-            </a:extLst>
-          </p:cNvPr>
-          <p:cNvSpPr txBox="1"/>
-          <p:nvPr/>
-        </p:nvSpPr>
-        <p:spPr>
-          <a:xfrm>
-            <a:off x="399495" y="1819922"/>
-            <a:ext cx="2237173" cy="4247317"/>
-          </a:xfrm>
-          <a:prstGeom prst="rect">
-            <a:avLst/>
-          </a:prstGeom>
-          <a:noFill/>
-        </p:spPr>
-        <p:txBody>
-          <a:bodyPr wrap="square" rtlCol="0">
-            <a:spAutoFit/>
-          </a:bodyPr>
-          <a:lstStyle/>
-          <a:p>
-            <a:pPr marL="285750" indent="-285750">
-              <a:buFont typeface="Arial" panose="020B0604020202020204" pitchFamily="34" charset="0"/>
-              <a:buChar char="•"/>
-            </a:pPr>
-            <a:r>
-              <a:rPr lang="da-DK" dirty="0"/>
-              <a:t>Docker</a:t>
-            </a:r>
-          </a:p>
-          <a:p>
-            <a:endParaRPr lang="da-DK" dirty="0"/>
-          </a:p>
-          <a:p>
-            <a:r>
-              <a:rPr lang="da-DK" dirty="0"/>
-              <a:t>Sprog:</a:t>
-            </a:r>
-          </a:p>
-          <a:p>
-            <a:pPr marL="285750" indent="-285750">
-              <a:buFont typeface="Arial" panose="020B0604020202020204" pitchFamily="34" charset="0"/>
-              <a:buChar char="•"/>
-            </a:pPr>
-            <a:r>
-              <a:rPr lang="da-DK" dirty="0"/>
-              <a:t>Java</a:t>
-            </a:r>
-          </a:p>
-          <a:p>
-            <a:pPr marL="285750" indent="-285750">
-              <a:buFont typeface="Arial" panose="020B0604020202020204" pitchFamily="34" charset="0"/>
-              <a:buChar char="•"/>
-            </a:pPr>
-            <a:r>
-              <a:rPr lang="da-DK" dirty="0"/>
-              <a:t>Python</a:t>
-            </a:r>
-          </a:p>
-          <a:p>
-            <a:pPr marL="285750" indent="-285750">
-              <a:buFont typeface="Arial" panose="020B0604020202020204" pitchFamily="34" charset="0"/>
-              <a:buChar char="•"/>
-            </a:pPr>
-            <a:r>
-              <a:rPr lang="da-DK" dirty="0"/>
-              <a:t>JavaScript</a:t>
-            </a:r>
-          </a:p>
-          <a:p>
-            <a:pPr marL="285750" indent="-285750">
-              <a:buFont typeface="Arial" panose="020B0604020202020204" pitchFamily="34" charset="0"/>
-              <a:buChar char="•"/>
-            </a:pPr>
-            <a:r>
-              <a:rPr lang="da-DK" dirty="0" err="1"/>
-              <a:t>TypeScript</a:t>
-            </a:r>
-            <a:endParaRPr lang="da-DK" dirty="0"/>
-          </a:p>
-          <a:p>
-            <a:pPr marL="285750" indent="-285750">
-              <a:buFont typeface="Arial" panose="020B0604020202020204" pitchFamily="34" charset="0"/>
-              <a:buChar char="•"/>
-            </a:pPr>
-            <a:endParaRPr lang="da-DK" dirty="0"/>
-          </a:p>
-          <a:p>
-            <a:r>
-              <a:rPr lang="da-DK" dirty="0"/>
-              <a:t>Frameworks:</a:t>
-            </a:r>
-          </a:p>
-          <a:p>
-            <a:pPr marL="285750" indent="-285750">
-              <a:buFont typeface="Arial" panose="020B0604020202020204" pitchFamily="34" charset="0"/>
-              <a:buChar char="•"/>
-            </a:pPr>
-            <a:r>
-              <a:rPr lang="da-DK" dirty="0"/>
-              <a:t>Vue.js</a:t>
-            </a:r>
-          </a:p>
-          <a:p>
-            <a:pPr marL="285750" indent="-285750">
-              <a:buFont typeface="Arial" panose="020B0604020202020204" pitchFamily="34" charset="0"/>
-              <a:buChar char="•"/>
-            </a:pPr>
-            <a:r>
-              <a:rPr lang="da-DK" dirty="0" err="1"/>
-              <a:t>NuxtJS</a:t>
-            </a:r>
-            <a:endParaRPr lang="da-DK" dirty="0"/>
-          </a:p>
-          <a:p>
-            <a:pPr marL="285750" indent="-285750">
-              <a:buFont typeface="Arial" panose="020B0604020202020204" pitchFamily="34" charset="0"/>
-              <a:buChar char="•"/>
-            </a:pPr>
-            <a:r>
-              <a:rPr lang="da-DK" dirty="0"/>
-              <a:t>Spring Boot</a:t>
-            </a:r>
-          </a:p>
-          <a:p>
-            <a:pPr marL="285750" indent="-285750">
-              <a:buFont typeface="Arial" panose="020B0604020202020204" pitchFamily="34" charset="0"/>
-              <a:buChar char="•"/>
-            </a:pPr>
-            <a:r>
-              <a:rPr lang="da-DK" dirty="0" err="1"/>
-              <a:t>NodeJS</a:t>
-            </a:r>
-            <a:endParaRPr lang="da-DK" dirty="0"/>
-          </a:p>
-          <a:p>
-            <a:pPr marL="285750" indent="-285750">
-              <a:buFont typeface="Arial" panose="020B0604020202020204" pitchFamily="34" charset="0"/>
-              <a:buChar char="•"/>
-            </a:pPr>
-            <a:r>
-              <a:rPr lang="da-DK" dirty="0" err="1"/>
-              <a:t>ExpressJS</a:t>
-            </a:r>
-            <a:endParaRPr lang="da-DK" dirty="0"/>
-          </a:p>
-          <a:p>
-            <a:pPr marL="285750" indent="-285750">
-              <a:buFont typeface="Arial" panose="020B0604020202020204" pitchFamily="34" charset="0"/>
-              <a:buChar char="•"/>
-            </a:pPr>
-            <a:endParaRPr lang="da-DK" dirty="0"/>
-          </a:p>
-        </p:txBody>
-      </p:sp>
     </p:spTree>
     <p:extLst>
       <p:ext uri="{BB962C8B-B14F-4D97-AF65-F5344CB8AC3E}">
@@ -6352,19 +6510,17 @@
       </p:sp>
       <p:pic>
         <p:nvPicPr>
-          <p:cNvPr id="5" name="Pladsholder til indhold 4">
+          <p:cNvPr id="9" name="Billede 8">
             <a:extLst>
               <a:ext uri="{FF2B5EF4-FFF2-40B4-BE49-F238E27FC236}">
-                <a16:creationId xmlns:a16="http://schemas.microsoft.com/office/drawing/2014/main" id="{2B3738C6-FCCF-42D9-84F9-BE0187FE9319}"/>
+                <a16:creationId xmlns:a16="http://schemas.microsoft.com/office/drawing/2014/main" id="{D08723C7-04FC-4CC1-967C-791CA2B9ACD0}"/>
               </a:ext>
             </a:extLst>
           </p:cNvPr>
           <p:cNvPicPr>
-            <a:picLocks noGrp="1" noChangeAspect="1"/>
+            <a:picLocks noChangeAspect="1"/>
           </p:cNvPicPr>
-          <p:nvPr>
-            <p:ph idx="1"/>
-          </p:nvPr>
+          <p:nvPr/>
         </p:nvPicPr>
         <p:blipFill>
           <a:blip r:embed="rId2"/>
@@ -6374,9 +6530,12 @@
         </p:blipFill>
         <p:spPr>
           <a:xfrm>
-            <a:off x="4879971" y="1740023"/>
-            <a:ext cx="2125208" cy="4967056"/>
-          </a:xfrm>
+            <a:off x="3452443" y="1875730"/>
+            <a:ext cx="5287113" cy="4982270"/>
+          </a:xfrm>
+          <a:prstGeom prst="rect">
+            <a:avLst/>
+          </a:prstGeom>
         </p:spPr>
       </p:pic>
     </p:spTree>
@@ -6450,49 +6609,62 @@
       </p:sp>
       <p:pic>
         <p:nvPicPr>
-          <p:cNvPr id="2050" name="Picture 2" descr="bpmn process diagram">
+          <p:cNvPr id="6" name="Billede 5">
             <a:extLst>
               <a:ext uri="{FF2B5EF4-FFF2-40B4-BE49-F238E27FC236}">
-                <a16:creationId xmlns:a16="http://schemas.microsoft.com/office/drawing/2014/main" id="{D76E1B94-0128-483A-8378-C09DEB20AFD6}"/>
+                <a16:creationId xmlns:a16="http://schemas.microsoft.com/office/drawing/2014/main" id="{030AF79D-5E31-4A24-8E06-38B7A45B09EF}"/>
               </a:ext>
             </a:extLst>
           </p:cNvPr>
           <p:cNvPicPr>
-            <a:picLocks noChangeAspect="1" noChangeArrowheads="1"/>
+            <a:picLocks noChangeAspect="1"/>
           </p:cNvPicPr>
           <p:nvPr/>
         </p:nvPicPr>
         <p:blipFill>
-          <a:blip r:embed="rId2">
-            <a:extLst>
-              <a:ext uri="{28A0092B-C50C-407E-A947-70E740481C1C}">
-                <a14:useLocalDpi xmlns:a14="http://schemas.microsoft.com/office/drawing/2010/main" val="0"/>
-              </a:ext>
-            </a:extLst>
-          </a:blip>
-          <a:srcRect/>
+          <a:blip r:embed="rId2"/>
           <a:stretch>
             <a:fillRect/>
           </a:stretch>
         </p:blipFill>
-        <p:spPr bwMode="auto">
-          <a:xfrm>
-            <a:off x="1823573" y="2193378"/>
-            <a:ext cx="8544854" cy="3893591"/>
+        <p:spPr>
+          <a:xfrm>
+            <a:off x="1566610" y="2214989"/>
+            <a:ext cx="8204375" cy="3860883"/>
           </a:xfrm>
           <a:prstGeom prst="rect">
             <a:avLst/>
           </a:prstGeom>
-          <a:noFill/>
-          <a:extLst>
-            <a:ext uri="{909E8E84-426E-40DD-AFC4-6F175D3DCCD1}">
-              <a14:hiddenFill xmlns:a14="http://schemas.microsoft.com/office/drawing/2010/main">
-                <a:solidFill>
-                  <a:srgbClr val="FFFFFF"/>
-                </a:solidFill>
-              </a14:hiddenFill>
-            </a:ext>
-          </a:extLst>
+        </p:spPr>
+      </p:pic>
+      <p:pic>
+        <p:nvPicPr>
+          <p:cNvPr id="8" name="Billede 7">
+            <a:extLst>
+              <a:ext uri="{FF2B5EF4-FFF2-40B4-BE49-F238E27FC236}">
+                <a16:creationId xmlns:a16="http://schemas.microsoft.com/office/drawing/2014/main" id="{BE4A9CAB-4D21-4E73-95ED-8C07C72E99F7}"/>
+              </a:ext>
+            </a:extLst>
+          </p:cNvPr>
+          <p:cNvPicPr>
+            <a:picLocks noChangeAspect="1"/>
+          </p:cNvPicPr>
+          <p:nvPr/>
+        </p:nvPicPr>
+        <p:blipFill>
+          <a:blip r:embed="rId3"/>
+          <a:stretch>
+            <a:fillRect/>
+          </a:stretch>
+        </p:blipFill>
+        <p:spPr>
+          <a:xfrm>
+            <a:off x="68716" y="1979720"/>
+            <a:ext cx="4544059" cy="2468597"/>
+          </a:xfrm>
+          <a:prstGeom prst="rect">
+            <a:avLst/>
+          </a:prstGeom>
         </p:spPr>
       </p:pic>
     </p:spTree>
@@ -6554,6 +6726,281 @@
             <a:pPr algn="ctr"/>
             <a:r>
               <a:rPr lang="da-DK" dirty="0"/>
+              <a:t>BPMN - </a:t>
+            </a:r>
+            <a:r>
+              <a:rPr lang="da-DK" dirty="0" err="1"/>
+              <a:t>Camunda</a:t>
+            </a:r>
+            <a:endParaRPr lang="da-DK" dirty="0"/>
+          </a:p>
+        </p:txBody>
+      </p:sp>
+      <p:pic>
+        <p:nvPicPr>
+          <p:cNvPr id="2050" name="Picture 2" descr="bpmn process diagram">
+            <a:extLst>
+              <a:ext uri="{FF2B5EF4-FFF2-40B4-BE49-F238E27FC236}">
+                <a16:creationId xmlns:a16="http://schemas.microsoft.com/office/drawing/2014/main" id="{D76E1B94-0128-483A-8378-C09DEB20AFD6}"/>
+              </a:ext>
+            </a:extLst>
+          </p:cNvPr>
+          <p:cNvPicPr>
+            <a:picLocks noChangeAspect="1" noChangeArrowheads="1"/>
+          </p:cNvPicPr>
+          <p:nvPr/>
+        </p:nvPicPr>
+        <p:blipFill>
+          <a:blip r:embed="rId2">
+            <a:extLst>
+              <a:ext uri="{28A0092B-C50C-407E-A947-70E740481C1C}">
+                <a14:useLocalDpi xmlns:a14="http://schemas.microsoft.com/office/drawing/2010/main" val="0"/>
+              </a:ext>
+            </a:extLst>
+          </a:blip>
+          <a:srcRect/>
+          <a:stretch>
+            <a:fillRect/>
+          </a:stretch>
+        </p:blipFill>
+        <p:spPr bwMode="auto">
+          <a:xfrm>
+            <a:off x="1823573" y="2193378"/>
+            <a:ext cx="8544854" cy="3893591"/>
+          </a:xfrm>
+          <a:prstGeom prst="rect">
+            <a:avLst/>
+          </a:prstGeom>
+          <a:noFill/>
+          <a:extLst>
+            <a:ext uri="{909E8E84-426E-40DD-AFC4-6F175D3DCCD1}">
+              <a14:hiddenFill xmlns:a14="http://schemas.microsoft.com/office/drawing/2010/main">
+                <a:solidFill>
+                  <a:srgbClr val="FFFFFF"/>
+                </a:solidFill>
+              </a14:hiddenFill>
+            </a:ext>
+          </a:extLst>
+        </p:spPr>
+      </p:pic>
+    </p:spTree>
+    <p:extLst>
+      <p:ext uri="{BB962C8B-B14F-4D97-AF65-F5344CB8AC3E}">
+        <p14:creationId xmlns:p14="http://schemas.microsoft.com/office/powerpoint/2010/main" val="1483497061"/>
+      </p:ext>
+    </p:extLst>
+  </p:cSld>
+  <p:clrMapOvr>
+    <a:masterClrMapping/>
+  </p:clrMapOvr>
+</p:sld>
+</file>
+
+<file path=ppt/slides/slide8.xml><?xml version="1.0" encoding="utf-8"?>
+<p:sld xmlns:a="http://schemas.openxmlformats.org/drawingml/2006/main" xmlns:r="http://schemas.openxmlformats.org/officeDocument/2006/relationships" xmlns:p="http://schemas.openxmlformats.org/presentationml/2006/main">
+  <p:cSld>
+    <p:spTree>
+      <p:nvGrpSpPr>
+        <p:cNvPr id="1" name=""/>
+        <p:cNvGrpSpPr/>
+        <p:nvPr/>
+      </p:nvGrpSpPr>
+      <p:grpSpPr>
+        <a:xfrm>
+          <a:off x="0" y="0"/>
+          <a:ext cx="0" cy="0"/>
+          <a:chOff x="0" y="0"/>
+          <a:chExt cx="0" cy="0"/>
+        </a:xfrm>
+      </p:grpSpPr>
+      <p:sp>
+        <p:nvSpPr>
+          <p:cNvPr id="2" name="Titel 1">
+            <a:extLst>
+              <a:ext uri="{FF2B5EF4-FFF2-40B4-BE49-F238E27FC236}">
+                <a16:creationId xmlns:a16="http://schemas.microsoft.com/office/drawing/2014/main" id="{A24D21CF-6803-48D5-85E7-10B922D346E9}"/>
+              </a:ext>
+            </a:extLst>
+          </p:cNvPr>
+          <p:cNvSpPr>
+            <a:spLocks noGrp="1"/>
+          </p:cNvSpPr>
+          <p:nvPr>
+            <p:ph type="title"/>
+          </p:nvPr>
+        </p:nvSpPr>
+        <p:spPr>
+          <a:xfrm>
+            <a:off x="1790700" y="782128"/>
+            <a:ext cx="8610600" cy="1293028"/>
+          </a:xfrm>
+        </p:spPr>
+        <p:txBody>
+          <a:bodyPr/>
+          <a:lstStyle/>
+          <a:p>
+            <a:pPr algn="ctr"/>
+            <a:r>
+              <a:rPr lang="da-DK" dirty="0"/>
+              <a:t>Message broker - </a:t>
+            </a:r>
+            <a:r>
+              <a:rPr lang="da-DK" dirty="0" err="1"/>
+              <a:t>rabbitmq</a:t>
+            </a:r>
+            <a:endParaRPr lang="da-DK" dirty="0"/>
+          </a:p>
+        </p:txBody>
+      </p:sp>
+      <p:pic>
+        <p:nvPicPr>
+          <p:cNvPr id="8" name="Billede 7">
+            <a:extLst>
+              <a:ext uri="{FF2B5EF4-FFF2-40B4-BE49-F238E27FC236}">
+                <a16:creationId xmlns:a16="http://schemas.microsoft.com/office/drawing/2014/main" id="{0EC2069D-70C7-402B-B637-1384B4D49396}"/>
+              </a:ext>
+            </a:extLst>
+          </p:cNvPr>
+          <p:cNvPicPr>
+            <a:picLocks noChangeAspect="1"/>
+          </p:cNvPicPr>
+          <p:nvPr/>
+        </p:nvPicPr>
+        <p:blipFill>
+          <a:blip r:embed="rId2"/>
+          <a:stretch>
+            <a:fillRect/>
+          </a:stretch>
+        </p:blipFill>
+        <p:spPr>
+          <a:xfrm>
+            <a:off x="2268429" y="1647934"/>
+            <a:ext cx="7655141" cy="5210066"/>
+          </a:xfrm>
+          <a:prstGeom prst="rect">
+            <a:avLst/>
+          </a:prstGeom>
+        </p:spPr>
+      </p:pic>
+      <p:pic>
+        <p:nvPicPr>
+          <p:cNvPr id="10" name="Billede 9">
+            <a:extLst>
+              <a:ext uri="{FF2B5EF4-FFF2-40B4-BE49-F238E27FC236}">
+                <a16:creationId xmlns:a16="http://schemas.microsoft.com/office/drawing/2014/main" id="{F07D9B2A-A27A-4874-A875-8BBA444F4ACF}"/>
+              </a:ext>
+            </a:extLst>
+          </p:cNvPr>
+          <p:cNvPicPr>
+            <a:picLocks noChangeAspect="1"/>
+          </p:cNvPicPr>
+          <p:nvPr/>
+        </p:nvPicPr>
+        <p:blipFill>
+          <a:blip r:embed="rId3"/>
+          <a:stretch>
+            <a:fillRect/>
+          </a:stretch>
+        </p:blipFill>
+        <p:spPr>
+          <a:xfrm>
+            <a:off x="1522594" y="1739639"/>
+            <a:ext cx="5759894" cy="3671140"/>
+          </a:xfrm>
+          <a:prstGeom prst="rect">
+            <a:avLst/>
+          </a:prstGeom>
+        </p:spPr>
+      </p:pic>
+      <p:pic>
+        <p:nvPicPr>
+          <p:cNvPr id="12" name="Billede 11">
+            <a:extLst>
+              <a:ext uri="{FF2B5EF4-FFF2-40B4-BE49-F238E27FC236}">
+                <a16:creationId xmlns:a16="http://schemas.microsoft.com/office/drawing/2014/main" id="{D1996EDD-A024-4356-B4CE-E0F9F96FD2B5}"/>
+              </a:ext>
+            </a:extLst>
+          </p:cNvPr>
+          <p:cNvPicPr>
+            <a:picLocks noChangeAspect="1"/>
+          </p:cNvPicPr>
+          <p:nvPr/>
+        </p:nvPicPr>
+        <p:blipFill>
+          <a:blip r:embed="rId3"/>
+          <a:stretch>
+            <a:fillRect/>
+          </a:stretch>
+        </p:blipFill>
+        <p:spPr>
+          <a:xfrm>
+            <a:off x="7561747" y="4471557"/>
+            <a:ext cx="2600688" cy="2195573"/>
+          </a:xfrm>
+          <a:prstGeom prst="rect">
+            <a:avLst/>
+          </a:prstGeom>
+        </p:spPr>
+      </p:pic>
+    </p:spTree>
+    <p:extLst>
+      <p:ext uri="{BB962C8B-B14F-4D97-AF65-F5344CB8AC3E}">
+        <p14:creationId xmlns:p14="http://schemas.microsoft.com/office/powerpoint/2010/main" val="2717097738"/>
+      </p:ext>
+    </p:extLst>
+  </p:cSld>
+  <p:clrMapOvr>
+    <a:masterClrMapping/>
+  </p:clrMapOvr>
+</p:sld>
+</file>
+
+<file path=ppt/slides/slide9.xml><?xml version="1.0" encoding="utf-8"?>
+<p:sld xmlns:a="http://schemas.openxmlformats.org/drawingml/2006/main" xmlns:r="http://schemas.openxmlformats.org/officeDocument/2006/relationships" xmlns:p="http://schemas.openxmlformats.org/presentationml/2006/main">
+  <p:cSld>
+    <p:spTree>
+      <p:nvGrpSpPr>
+        <p:cNvPr id="1" name=""/>
+        <p:cNvGrpSpPr/>
+        <p:nvPr/>
+      </p:nvGrpSpPr>
+      <p:grpSpPr>
+        <a:xfrm>
+          <a:off x="0" y="0"/>
+          <a:ext cx="0" cy="0"/>
+          <a:chOff x="0" y="0"/>
+          <a:chExt cx="0" cy="0"/>
+        </a:xfrm>
+      </p:grpSpPr>
+      <p:sp>
+        <p:nvSpPr>
+          <p:cNvPr id="2" name="Titel 1">
+            <a:extLst>
+              <a:ext uri="{FF2B5EF4-FFF2-40B4-BE49-F238E27FC236}">
+                <a16:creationId xmlns:a16="http://schemas.microsoft.com/office/drawing/2014/main" id="{A24D21CF-6803-48D5-85E7-10B922D346E9}"/>
+              </a:ext>
+            </a:extLst>
+          </p:cNvPr>
+          <p:cNvSpPr>
+            <a:spLocks noGrp="1"/>
+          </p:cNvSpPr>
+          <p:nvPr>
+            <p:ph type="title"/>
+          </p:nvPr>
+        </p:nvSpPr>
+        <p:spPr>
+          <a:xfrm>
+            <a:off x="1790700" y="782128"/>
+            <a:ext cx="8610600" cy="1293028"/>
+          </a:xfrm>
+        </p:spPr>
+        <p:txBody>
+          <a:bodyPr/>
+          <a:lstStyle/>
+          <a:p>
+            <a:pPr algn="ctr"/>
+            <a:r>
+              <a:rPr lang="da-DK" dirty="0"/>
               <a:t>Message broker - </a:t>
             </a:r>
             <a:r>
@@ -6612,102 +7059,7 @@
     </p:spTree>
     <p:extLst>
       <p:ext uri="{BB962C8B-B14F-4D97-AF65-F5344CB8AC3E}">
-        <p14:creationId xmlns:p14="http://schemas.microsoft.com/office/powerpoint/2010/main" val="2717097738"/>
-      </p:ext>
-    </p:extLst>
-  </p:cSld>
-  <p:clrMapOvr>
-    <a:masterClrMapping/>
-  </p:clrMapOvr>
-</p:sld>
-</file>
-
-<file path=ppt/slides/slide8.xml><?xml version="1.0" encoding="utf-8"?>
-<p:sld xmlns:a="http://schemas.openxmlformats.org/drawingml/2006/main" xmlns:r="http://schemas.openxmlformats.org/officeDocument/2006/relationships" xmlns:p="http://schemas.openxmlformats.org/presentationml/2006/main">
-  <p:cSld>
-    <p:spTree>
-      <p:nvGrpSpPr>
-        <p:cNvPr id="1" name=""/>
-        <p:cNvGrpSpPr/>
-        <p:nvPr/>
-      </p:nvGrpSpPr>
-      <p:grpSpPr>
-        <a:xfrm>
-          <a:off x="0" y="0"/>
-          <a:ext cx="0" cy="0"/>
-          <a:chOff x="0" y="0"/>
-          <a:chExt cx="0" cy="0"/>
-        </a:xfrm>
-      </p:grpSpPr>
-      <p:sp>
-        <p:nvSpPr>
-          <p:cNvPr id="2" name="Titel 1">
-            <a:extLst>
-              <a:ext uri="{FF2B5EF4-FFF2-40B4-BE49-F238E27FC236}">
-                <a16:creationId xmlns:a16="http://schemas.microsoft.com/office/drawing/2014/main" id="{A24D21CF-6803-48D5-85E7-10B922D346E9}"/>
-              </a:ext>
-            </a:extLst>
-          </p:cNvPr>
-          <p:cNvSpPr>
-            <a:spLocks noGrp="1"/>
-          </p:cNvSpPr>
-          <p:nvPr>
-            <p:ph type="title"/>
-          </p:nvPr>
-        </p:nvSpPr>
-        <p:spPr>
-          <a:xfrm>
-            <a:off x="1790700" y="782128"/>
-            <a:ext cx="8610600" cy="1293028"/>
-          </a:xfrm>
-        </p:spPr>
-        <p:txBody>
-          <a:bodyPr/>
-          <a:lstStyle/>
-          <a:p>
-            <a:pPr algn="ctr"/>
-            <a:r>
-              <a:rPr lang="da-DK" dirty="0" err="1"/>
-              <a:t>microservices</a:t>
-            </a:r>
-            <a:endParaRPr lang="da-DK" dirty="0"/>
-          </a:p>
-        </p:txBody>
-      </p:sp>
-      <p:pic>
-        <p:nvPicPr>
-          <p:cNvPr id="4" name="Billede 3">
-            <a:extLst>
-              <a:ext uri="{FF2B5EF4-FFF2-40B4-BE49-F238E27FC236}">
-                <a16:creationId xmlns:a16="http://schemas.microsoft.com/office/drawing/2014/main" id="{D57EAC2C-EC16-486C-9D6A-A66348B04573}"/>
-              </a:ext>
-            </a:extLst>
-          </p:cNvPr>
-          <p:cNvPicPr>
-            <a:picLocks noChangeAspect="1"/>
-          </p:cNvPicPr>
-          <p:nvPr/>
-        </p:nvPicPr>
-        <p:blipFill>
-          <a:blip r:embed="rId2"/>
-          <a:stretch>
-            <a:fillRect/>
-          </a:stretch>
-        </p:blipFill>
-        <p:spPr>
-          <a:xfrm>
-            <a:off x="3479848" y="1831252"/>
-            <a:ext cx="5232303" cy="5026748"/>
-          </a:xfrm>
-          <a:prstGeom prst="rect">
-            <a:avLst/>
-          </a:prstGeom>
-        </p:spPr>
-      </p:pic>
-    </p:spTree>
-    <p:extLst>
-      <p:ext uri="{BB962C8B-B14F-4D97-AF65-F5344CB8AC3E}">
-        <p14:creationId xmlns:p14="http://schemas.microsoft.com/office/powerpoint/2010/main" val="2229089420"/>
+        <p14:creationId xmlns:p14="http://schemas.microsoft.com/office/powerpoint/2010/main" val="4075043045"/>
       </p:ext>
     </p:extLst>
   </p:cSld>

</xml_diff>